<commit_message>
added notes to slide deck
</commit_message>
<xml_diff>
--- a/Group_F_Minneapolis Police Stops Presentation.pptx
+++ b/Group_F_Minneapolis Police Stops Presentation.pptx
@@ -371,7 +371,7 @@
             <a:fld id="{B61BEF0D-F0BB-DE4B-95CE-6DB70DBA9567}" type="datetimeFigureOut">
               <a:rPr lang="en-US" smtClean="0"/>
               <a:pPr/>
-              <a:t>11/4/2018</a:t>
+              <a:t>11/6/18</a:t>
             </a:fld>
             <a:endParaRPr lang="en-US" dirty="0"/>
           </a:p>
@@ -571,7 +571,7 @@
             <a:fld id="{B61BEF0D-F0BB-DE4B-95CE-6DB70DBA9567}" type="datetimeFigureOut">
               <a:rPr lang="en-US" smtClean="0"/>
               <a:pPr/>
-              <a:t>11/4/2018</a:t>
+              <a:t>11/6/18</a:t>
             </a:fld>
             <a:endParaRPr lang="en-US" dirty="0"/>
           </a:p>
@@ -781,7 +781,7 @@
             <a:fld id="{B61BEF0D-F0BB-DE4B-95CE-6DB70DBA9567}" type="datetimeFigureOut">
               <a:rPr lang="en-US" smtClean="0"/>
               <a:pPr/>
-              <a:t>11/4/2018</a:t>
+              <a:t>11/6/18</a:t>
             </a:fld>
             <a:endParaRPr lang="en-US" dirty="0"/>
           </a:p>
@@ -981,7 +981,7 @@
             <a:fld id="{B61BEF0D-F0BB-DE4B-95CE-6DB70DBA9567}" type="datetimeFigureOut">
               <a:rPr lang="en-US" smtClean="0"/>
               <a:pPr/>
-              <a:t>11/4/2018</a:t>
+              <a:t>11/6/18</a:t>
             </a:fld>
             <a:endParaRPr lang="en-US" dirty="0"/>
           </a:p>
@@ -1258,7 +1258,7 @@
             <a:fld id="{B61BEF0D-F0BB-DE4B-95CE-6DB70DBA9567}" type="datetimeFigureOut">
               <a:rPr lang="en-US" smtClean="0"/>
               <a:pPr/>
-              <a:t>11/4/2018</a:t>
+              <a:t>11/6/18</a:t>
             </a:fld>
             <a:endParaRPr lang="en-US" dirty="0"/>
           </a:p>
@@ -1525,7 +1525,7 @@
             <a:fld id="{B61BEF0D-F0BB-DE4B-95CE-6DB70DBA9567}" type="datetimeFigureOut">
               <a:rPr lang="en-US" smtClean="0"/>
               <a:pPr/>
-              <a:t>11/4/2018</a:t>
+              <a:t>11/6/18</a:t>
             </a:fld>
             <a:endParaRPr lang="en-US" dirty="0"/>
           </a:p>
@@ -1939,7 +1939,7 @@
             <a:fld id="{B61BEF0D-F0BB-DE4B-95CE-6DB70DBA9567}" type="datetimeFigureOut">
               <a:rPr lang="en-US" smtClean="0"/>
               <a:pPr/>
-              <a:t>11/4/2018</a:t>
+              <a:t>11/6/18</a:t>
             </a:fld>
             <a:endParaRPr lang="en-US" dirty="0"/>
           </a:p>
@@ -2082,7 +2082,7 @@
             <a:fld id="{B61BEF0D-F0BB-DE4B-95CE-6DB70DBA9567}" type="datetimeFigureOut">
               <a:rPr lang="en-US" smtClean="0"/>
               <a:pPr/>
-              <a:t>11/4/2018</a:t>
+              <a:t>11/6/18</a:t>
             </a:fld>
             <a:endParaRPr lang="en-US" dirty="0"/>
           </a:p>
@@ -2197,7 +2197,7 @@
             <a:fld id="{B61BEF0D-F0BB-DE4B-95CE-6DB70DBA9567}" type="datetimeFigureOut">
               <a:rPr lang="en-US" smtClean="0"/>
               <a:pPr/>
-              <a:t>11/4/2018</a:t>
+              <a:t>11/6/18</a:t>
             </a:fld>
             <a:endParaRPr lang="en-US" dirty="0"/>
           </a:p>
@@ -2510,7 +2510,7 @@
             <a:fld id="{B61BEF0D-F0BB-DE4B-95CE-6DB70DBA9567}" type="datetimeFigureOut">
               <a:rPr lang="en-US" smtClean="0"/>
               <a:pPr/>
-              <a:t>11/4/2018</a:t>
+              <a:t>11/6/18</a:t>
             </a:fld>
             <a:endParaRPr lang="en-US" dirty="0"/>
           </a:p>
@@ -2800,7 +2800,7 @@
             <a:fld id="{B61BEF0D-F0BB-DE4B-95CE-6DB70DBA9567}" type="datetimeFigureOut">
               <a:rPr lang="en-US" smtClean="0"/>
               <a:pPr/>
-              <a:t>11/4/2018</a:t>
+              <a:t>11/6/18</a:t>
             </a:fld>
             <a:endParaRPr lang="en-US" dirty="0"/>
           </a:p>
@@ -3043,7 +3043,7 @@
             <a:fld id="{B61BEF0D-F0BB-DE4B-95CE-6DB70DBA9567}" type="datetimeFigureOut">
               <a:rPr lang="en-US" smtClean="0"/>
               <a:pPr/>
-              <a:t>11/4/2018</a:t>
+              <a:t>11/6/18</a:t>
             </a:fld>
             <a:endParaRPr lang="en-US" dirty="0"/>
           </a:p>
@@ -3606,20 +3606,21 @@
           <a:p>
             <a:r>
               <a:rPr lang="en-US" dirty="0"/>
-              <a:t>Define the core message or hypothesis of your project</a:t>
+              <a:t>Our project was to understand whether or not diversity indicators (such as race, gender) correlate to police stops in Minneapolis. </a:t>
             </a:r>
           </a:p>
           <a:p>
             <a:r>
               <a:rPr lang="en-US" dirty="0"/>
-              <a:t>Describe the questions you asked, and why you asked them</a:t>
-            </a:r>
-          </a:p>
-          <a:p>
-            <a:r>
-              <a:rPr lang="en-US" dirty="0"/>
-              <a:t>Describe whether you were able to answer these questions to your satisfaction, and briefly summarize your findings</a:t>
-            </a:r>
+              <a:t>We sought to answer questions such as which factors (if any) relate to traffic stops and whether or not any of these factors correlated to persons or vehicles were searched.</a:t>
+            </a:r>
+          </a:p>
+          <a:p>
+            <a:endParaRPr lang="en-US" dirty="0"/>
+          </a:p>
+          <a:p>
+            <a:pPr lvl="1"/>
+            <a:endParaRPr lang="en-US" dirty="0"/>
           </a:p>
         </p:txBody>
       </p:sp>
@@ -3702,10 +3703,34 @@
           <a:bodyPr/>
           <a:lstStyle/>
           <a:p>
+            <a:pPr lvl="0"/>
             <a:r>
               <a:rPr lang="en-US" dirty="0"/>
-              <a:t>Elaborate on the questions you asked, describing what kinds of data you needed to answer them, and where you found it</a:t>
-            </a:r>
+              <a:t>Are there more stops during the morning, afternoon, evening or night shifts?</a:t>
+            </a:r>
+          </a:p>
+          <a:p>
+            <a:pPr lvl="0"/>
+            <a:r>
+              <a:rPr lang="en-US" dirty="0"/>
+              <a:t> Are there proportional differences in race given the stops recorded by precinct?</a:t>
+            </a:r>
+          </a:p>
+          <a:p>
+            <a:r>
+              <a:rPr lang="en-US" dirty="0"/>
+              <a:t>What is the likelihood of an officer stop by race? And what is the likelihood that the pre-race determination matched the actual race documented after the stop?</a:t>
+            </a:r>
+          </a:p>
+          <a:p>
+            <a:r>
+              <a:rPr lang="en-US" dirty="0"/>
+              <a:t>Does the type of police stop (traffic vs suspicious) impact whether a person is searched?</a:t>
+            </a:r>
+          </a:p>
+          <a:p>
+            <a:pPr lvl="0"/>
+            <a:endParaRPr lang="en-US" dirty="0"/>
           </a:p>
         </p:txBody>
       </p:sp>
@@ -3793,24 +3818,55 @@
         </p:nvSpPr>
         <p:spPr/>
         <p:txBody>
-          <a:bodyPr/>
-          <a:lstStyle/>
+          <a:bodyPr>
+            <a:normAutofit fontScale="92500" lnSpcReduction="20000"/>
+          </a:bodyPr>
+          <a:lstStyle/>
+          <a:p>
+            <a:pPr marL="0" indent="0">
+              <a:buNone/>
+            </a:pPr>
+            <a:r>
+              <a:rPr lang="en-US" dirty="0">
+                <a:solidFill>
+                  <a:srgbClr val="FF0000"/>
+                </a:solidFill>
+              </a:rPr>
+              <a:t>I think the first few bullets can be talking points and we do not necessarily need a slide for this… not sure what to include for the fourth bullet point – screen clips of </a:t>
+            </a:r>
+            <a:r>
+              <a:rPr lang="en-US" dirty="0" err="1">
+                <a:solidFill>
+                  <a:srgbClr val="FF0000"/>
+                </a:solidFill>
+              </a:rPr>
+              <a:t>Jupyter</a:t>
+            </a:r>
+            <a:r>
+              <a:rPr lang="en-US" dirty="0">
+                <a:solidFill>
+                  <a:srgbClr val="FF0000"/>
+                </a:solidFill>
+              </a:rPr>
+              <a:t> Notebook data types / row counts?</a:t>
+            </a:r>
+          </a:p>
           <a:p>
             <a:r>
               <a:rPr lang="en-US" dirty="0"/>
-              <a:t>Describe the exploration and cleanup process</a:t>
+              <a:t>Describe the exploration and cleanup process: read the file into a pandas data frame, observed n/a values.</a:t>
             </a:r>
           </a:p>
           <a:p>
             <a:r>
               <a:rPr lang="en-US" dirty="0"/>
-              <a:t>Discuss insights you had while exploring the data that you did not anticipate</a:t>
+              <a:t>Discuss insights you had while exploring the data that you did not anticipate: accuracy of race identification</a:t>
             </a:r>
           </a:p>
           <a:p>
             <a:r>
               <a:rPr lang="en-US" dirty="0"/>
-              <a:t>Discuss any problems that arose after exploring the data, and how you resolved them</a:t>
+              <a:t>Discuss any problems that arose after exploring the data, and how you resolved them: n/a values – researched through MN website; figuring out how to deal with date timestamps</a:t>
             </a:r>
           </a:p>
           <a:p>
@@ -4100,6 +4156,20 @@
             </a:r>
           </a:p>
           <a:p>
+            <a:pPr lvl="1"/>
+            <a:r>
+              <a:rPr lang="en-US" dirty="0"/>
+              <a:t>Incorporating census data / timeframe of that data compared to our data set</a:t>
+            </a:r>
+          </a:p>
+          <a:p>
+            <a:pPr lvl="1"/>
+            <a:r>
+              <a:rPr lang="en-US" dirty="0"/>
+              <a:t>Census data may not correlate to traffic stops given that not everyone stopped is a resident of the area where they were stopped</a:t>
+            </a:r>
+          </a:p>
+          <a:p>
             <a:r>
               <a:rPr lang="en-US" dirty="0"/>
               <a:t>Discuss any additional questions that came up, but which you did not not have time to answer</a:t>
@@ -4193,6 +4263,9 @@
           <a:bodyPr/>
           <a:lstStyle/>
           <a:p>
+            <a:pPr marL="0" indent="0" algn="ctr">
+              <a:buNone/>
+            </a:pPr>
             <a:endParaRPr lang="en-US" dirty="0"/>
           </a:p>
         </p:txBody>

</xml_diff>